<commit_message>
CongThanh: up quiz source
</commit_message>
<xml_diff>
--- a/thanh-web/educa/BaoCao.pptx
+++ b/thanh-web/educa/BaoCao.pptx
@@ -6,15 +6,19 @@
   </p:sldMasterIdLst>
   <p:sldIdLst>
     <p:sldId id="256" r:id="rId2"/>
-    <p:sldId id="257" r:id="rId3"/>
-    <p:sldId id="258" r:id="rId4"/>
-    <p:sldId id="259" r:id="rId5"/>
-    <p:sldId id="260" r:id="rId6"/>
-    <p:sldId id="265" r:id="rId7"/>
-    <p:sldId id="264" r:id="rId8"/>
-    <p:sldId id="263" r:id="rId9"/>
-    <p:sldId id="262" r:id="rId10"/>
-    <p:sldId id="261" r:id="rId11"/>
+    <p:sldId id="266" r:id="rId3"/>
+    <p:sldId id="267" r:id="rId4"/>
+    <p:sldId id="269" r:id="rId5"/>
+    <p:sldId id="263" r:id="rId6"/>
+    <p:sldId id="268" r:id="rId7"/>
+    <p:sldId id="260" r:id="rId8"/>
+    <p:sldId id="265" r:id="rId9"/>
+    <p:sldId id="264" r:id="rId10"/>
+    <p:sldId id="262" r:id="rId11"/>
+    <p:sldId id="258" r:id="rId12"/>
+    <p:sldId id="259" r:id="rId13"/>
+    <p:sldId id="261" r:id="rId14"/>
+    <p:sldId id="270" r:id="rId15"/>
   </p:sldIdLst>
   <p:sldSz cx="9144000" cy="6858000" type="screen4x3"/>
   <p:notesSz cx="6858000" cy="9144000"/>
@@ -297,7 +301,7 @@
           <a:p>
             <a:fld id="{96DEFD1E-B57A-49F8-8AD4-AE7C97B79B9C}" type="datetimeFigureOut">
               <a:rPr lang="en-US" smtClean="0"/>
-              <a:t>25/11/18</a:t>
+              <a:t>02/12/18</a:t>
             </a:fld>
             <a:endParaRPr lang="en-US"/>
           </a:p>
@@ -467,7 +471,7 @@
           <a:p>
             <a:fld id="{96DEFD1E-B57A-49F8-8AD4-AE7C97B79B9C}" type="datetimeFigureOut">
               <a:rPr lang="en-US" smtClean="0"/>
-              <a:t>25/11/18</a:t>
+              <a:t>02/12/18</a:t>
             </a:fld>
             <a:endParaRPr lang="en-US"/>
           </a:p>
@@ -647,7 +651,7 @@
           <a:p>
             <a:fld id="{96DEFD1E-B57A-49F8-8AD4-AE7C97B79B9C}" type="datetimeFigureOut">
               <a:rPr lang="en-US" smtClean="0"/>
-              <a:t>25/11/18</a:t>
+              <a:t>02/12/18</a:t>
             </a:fld>
             <a:endParaRPr lang="en-US"/>
           </a:p>
@@ -817,7 +821,7 @@
           <a:p>
             <a:fld id="{96DEFD1E-B57A-49F8-8AD4-AE7C97B79B9C}" type="datetimeFigureOut">
               <a:rPr lang="en-US" smtClean="0"/>
-              <a:t>25/11/18</a:t>
+              <a:t>02/12/18</a:t>
             </a:fld>
             <a:endParaRPr lang="en-US"/>
           </a:p>
@@ -1063,7 +1067,7 @@
           <a:p>
             <a:fld id="{96DEFD1E-B57A-49F8-8AD4-AE7C97B79B9C}" type="datetimeFigureOut">
               <a:rPr lang="en-US" smtClean="0"/>
-              <a:t>25/11/18</a:t>
+              <a:t>02/12/18</a:t>
             </a:fld>
             <a:endParaRPr lang="en-US"/>
           </a:p>
@@ -1351,7 +1355,7 @@
           <a:p>
             <a:fld id="{96DEFD1E-B57A-49F8-8AD4-AE7C97B79B9C}" type="datetimeFigureOut">
               <a:rPr lang="en-US" smtClean="0"/>
-              <a:t>25/11/18</a:t>
+              <a:t>02/12/18</a:t>
             </a:fld>
             <a:endParaRPr lang="en-US"/>
           </a:p>
@@ -1773,7 +1777,7 @@
           <a:p>
             <a:fld id="{96DEFD1E-B57A-49F8-8AD4-AE7C97B79B9C}" type="datetimeFigureOut">
               <a:rPr lang="en-US" smtClean="0"/>
-              <a:t>25/11/18</a:t>
+              <a:t>02/12/18</a:t>
             </a:fld>
             <a:endParaRPr lang="en-US"/>
           </a:p>
@@ -1891,7 +1895,7 @@
           <a:p>
             <a:fld id="{96DEFD1E-B57A-49F8-8AD4-AE7C97B79B9C}" type="datetimeFigureOut">
               <a:rPr lang="en-US" smtClean="0"/>
-              <a:t>25/11/18</a:t>
+              <a:t>02/12/18</a:t>
             </a:fld>
             <a:endParaRPr lang="en-US"/>
           </a:p>
@@ -1986,7 +1990,7 @@
           <a:p>
             <a:fld id="{96DEFD1E-B57A-49F8-8AD4-AE7C97B79B9C}" type="datetimeFigureOut">
               <a:rPr lang="en-US" smtClean="0"/>
-              <a:t>25/11/18</a:t>
+              <a:t>02/12/18</a:t>
             </a:fld>
             <a:endParaRPr lang="en-US"/>
           </a:p>
@@ -2263,7 +2267,7 @@
           <a:p>
             <a:fld id="{96DEFD1E-B57A-49F8-8AD4-AE7C97B79B9C}" type="datetimeFigureOut">
               <a:rPr lang="en-US" smtClean="0"/>
-              <a:t>25/11/18</a:t>
+              <a:t>02/12/18</a:t>
             </a:fld>
             <a:endParaRPr lang="en-US"/>
           </a:p>
@@ -2516,7 +2520,7 @@
           <a:p>
             <a:fld id="{96DEFD1E-B57A-49F8-8AD4-AE7C97B79B9C}" type="datetimeFigureOut">
               <a:rPr lang="en-US" smtClean="0"/>
-              <a:t>25/11/18</a:t>
+              <a:t>02/12/18</a:t>
             </a:fld>
             <a:endParaRPr lang="en-US"/>
           </a:p>
@@ -2729,7 +2733,7 @@
           <a:p>
             <a:fld id="{96DEFD1E-B57A-49F8-8AD4-AE7C97B79B9C}" type="datetimeFigureOut">
               <a:rPr lang="en-US" smtClean="0"/>
-              <a:t>25/11/18</a:t>
+              <a:t>02/12/18</a:t>
             </a:fld>
             <a:endParaRPr lang="en-US"/>
           </a:p>
@@ -3217,92 +3221,13 @@
           <a:bodyPr/>
           <a:lstStyle/>
           <a:p>
-            <a:endParaRPr lang="en-US"/>
-          </a:p>
-        </p:txBody>
-      </p:sp>
-    </p:spTree>
-    <p:extLst>
-      <p:ext uri="{BB962C8B-B14F-4D97-AF65-F5344CB8AC3E}">
-        <p14:creationId xmlns:p14="http://schemas.microsoft.com/office/powerpoint/2010/main" val="1117490252"/>
-      </p:ext>
-    </p:extLst>
-  </p:cSld>
-  <p:clrMapOvr>
-    <a:masterClrMapping/>
-  </p:clrMapOvr>
-  <p:timing>
-    <p:tnLst>
-      <p:par>
-        <p:cTn id="1" dur="indefinite" restart="never" nodeType="tmRoot"/>
-      </p:par>
-    </p:tnLst>
-  </p:timing>
-</p:sld>
-</file>
-
-<file path=ppt/slides/slide2.xml><?xml version="1.0" encoding="utf-8"?>
-<p:sld xmlns:a="http://schemas.openxmlformats.org/drawingml/2006/main" xmlns:r="http://schemas.openxmlformats.org/officeDocument/2006/relationships" xmlns:p="http://schemas.openxmlformats.org/presentationml/2006/main">
-  <p:cSld>
-    <p:spTree>
-      <p:nvGrpSpPr>
-        <p:cNvPr id="1" name=""/>
-        <p:cNvGrpSpPr/>
-        <p:nvPr/>
-      </p:nvGrpSpPr>
-      <p:grpSpPr>
-        <a:xfrm>
-          <a:off x="0" y="0"/>
-          <a:ext cx="0" cy="0"/>
-          <a:chOff x="0" y="0"/>
-          <a:chExt cx="0" cy="0"/>
-        </a:xfrm>
-      </p:grpSpPr>
-      <p:sp>
-        <p:nvSpPr>
-          <p:cNvPr id="2" name="Title 1"/>
-          <p:cNvSpPr>
-            <a:spLocks noGrp="1"/>
-          </p:cNvSpPr>
-          <p:nvPr>
-            <p:ph type="title"/>
-          </p:nvPr>
-        </p:nvSpPr>
-        <p:spPr/>
-        <p:txBody>
-          <a:bodyPr/>
-          <a:lstStyle/>
-          <a:p>
-            <a:r>
-              <a:rPr lang="en-US" dirty="0" smtClean="0"/>
-              <a:t>urls.py (setting)</a:t>
-            </a:r>
-            <a:endParaRPr lang="en-US" dirty="0"/>
-          </a:p>
-        </p:txBody>
-      </p:sp>
-      <p:sp>
-        <p:nvSpPr>
-          <p:cNvPr id="3" name="Content Placeholder 2"/>
-          <p:cNvSpPr>
-            <a:spLocks noGrp="1"/>
-          </p:cNvSpPr>
-          <p:nvPr>
-            <p:ph idx="1"/>
-          </p:nvPr>
-        </p:nvSpPr>
-        <p:spPr/>
-        <p:txBody>
-          <a:bodyPr/>
-          <a:lstStyle/>
-          <a:p>
             <a:endParaRPr lang="en-US" dirty="0"/>
           </a:p>
         </p:txBody>
       </p:sp>
       <p:pic>
         <p:nvPicPr>
-          <p:cNvPr id="1027" name="Picture 3"/>
+          <p:cNvPr id="5122" name="Picture 2"/>
           <p:cNvPicPr>
             <a:picLocks noChangeAspect="1" noChangeArrowheads="1"/>
           </p:cNvPicPr>
@@ -3323,17 +3248,22 @@
         </p:blipFill>
         <p:spPr bwMode="auto">
           <a:xfrm>
-            <a:off x="302341" y="2219324"/>
-            <a:ext cx="8851275" cy="2657475"/>
+            <a:off x="0" y="762000"/>
+            <a:ext cx="3362325" cy="4562475"/>
           </a:xfrm>
           <a:prstGeom prst="rect">
             <a:avLst/>
           </a:prstGeom>
-          <a:noFill/>
           <a:ln>
             <a:noFill/>
           </a:ln>
-          <a:effectLst/>
+          <a:effectLst>
+            <a:outerShdw blurRad="292100" dist="139700" dir="2700000" algn="tl" rotWithShape="0">
+              <a:srgbClr val="333333">
+                <a:alpha val="65000"/>
+              </a:srgbClr>
+            </a:outerShdw>
+          </a:effectLst>
           <a:extLst>
             <a:ext uri="{909E8E84-426E-40DD-AFC4-6F175D3DCCD1}">
               <a14:hiddenFill xmlns:a14="http://schemas.microsoft.com/office/drawing/2010/main">
@@ -3364,10 +3294,278 @@
           </a:extLst>
         </p:spPr>
       </p:pic>
+      <p:pic>
+        <p:nvPicPr>
+          <p:cNvPr id="5124" name="Picture 4"/>
+          <p:cNvPicPr>
+            <a:picLocks noChangeAspect="1" noChangeArrowheads="1"/>
+          </p:cNvPicPr>
+          <p:nvPr/>
+        </p:nvPicPr>
+        <p:blipFill>
+          <a:blip r:embed="rId3">
+            <a:extLst>
+              <a:ext uri="{28A0092B-C50C-407E-A947-70E740481C1C}">
+                <a14:useLocalDpi xmlns:a14="http://schemas.microsoft.com/office/drawing/2010/main" val="0"/>
+              </a:ext>
+            </a:extLst>
+          </a:blip>
+          <a:srcRect/>
+          <a:stretch>
+            <a:fillRect/>
+          </a:stretch>
+        </p:blipFill>
+        <p:spPr bwMode="auto">
+          <a:xfrm>
+            <a:off x="2600325" y="2513351"/>
+            <a:ext cx="3152775" cy="4162425"/>
+          </a:xfrm>
+          <a:prstGeom prst="rect">
+            <a:avLst/>
+          </a:prstGeom>
+          <a:ln w="190500" cap="sq">
+            <a:solidFill>
+              <a:srgbClr val="C8C6BD"/>
+            </a:solidFill>
+            <a:prstDash val="solid"/>
+            <a:miter lim="800000"/>
+          </a:ln>
+          <a:effectLst>
+            <a:outerShdw blurRad="254000" algn="bl" rotWithShape="0">
+              <a:srgbClr val="000000">
+                <a:alpha val="43000"/>
+              </a:srgbClr>
+            </a:outerShdw>
+          </a:effectLst>
+          <a:scene3d>
+            <a:camera prst="perspectiveFront" fov="5400000"/>
+            <a:lightRig rig="threePt" dir="t">
+              <a:rot lat="0" lon="0" rev="2100000"/>
+            </a:lightRig>
+          </a:scene3d>
+          <a:sp3d extrusionH="25400">
+            <a:bevelT w="304800" h="152400" prst="hardEdge"/>
+            <a:extrusionClr>
+              <a:srgbClr val="000000"/>
+            </a:extrusionClr>
+          </a:sp3d>
+          <a:extLst>
+            <a:ext uri="{909E8E84-426E-40DD-AFC4-6F175D3DCCD1}">
+              <a14:hiddenFill xmlns:a14="http://schemas.microsoft.com/office/drawing/2010/main">
+                <a:solidFill>
+                  <a:schemeClr val="accent1"/>
+                </a:solidFill>
+              </a14:hiddenFill>
+            </a:ext>
+            <a:ext uri="{91240B29-F687-4F45-9708-019B960494DF}">
+              <a14:hiddenLine xmlns:a14="http://schemas.microsoft.com/office/drawing/2010/main" w="9525">
+                <a:solidFill>
+                  <a:schemeClr val="tx1"/>
+                </a:solidFill>
+                <a:miter lim="800000"/>
+                <a:headEnd/>
+                <a:tailEnd/>
+              </a14:hiddenLine>
+            </a:ext>
+            <a:ext uri="{AF507438-7753-43E0-B8FC-AC1667EBCBE1}">
+              <a14:hiddenEffects xmlns:a14="http://schemas.microsoft.com/office/drawing/2010/main">
+                <a:effectLst>
+                  <a:outerShdw dist="35921" dir="2700000" algn="ctr" rotWithShape="0">
+                    <a:schemeClr val="bg2"/>
+                  </a:outerShdw>
+                </a:effectLst>
+              </a14:hiddenEffects>
+            </a:ext>
+          </a:extLst>
+        </p:spPr>
+      </p:pic>
+      <p:pic>
+        <p:nvPicPr>
+          <p:cNvPr id="5125" name="Picture 5"/>
+          <p:cNvPicPr>
+            <a:picLocks noChangeAspect="1" noChangeArrowheads="1"/>
+          </p:cNvPicPr>
+          <p:nvPr/>
+        </p:nvPicPr>
+        <p:blipFill>
+          <a:blip r:embed="rId4">
+            <a:extLst>
+              <a:ext uri="{28A0092B-C50C-407E-A947-70E740481C1C}">
+                <a14:useLocalDpi xmlns:a14="http://schemas.microsoft.com/office/drawing/2010/main" val="0"/>
+              </a:ext>
+            </a:extLst>
+          </a:blip>
+          <a:srcRect/>
+          <a:stretch>
+            <a:fillRect/>
+          </a:stretch>
+        </p:blipFill>
+        <p:spPr bwMode="auto">
+          <a:xfrm>
+            <a:off x="5753100" y="1530452"/>
+            <a:ext cx="3390900" cy="4410075"/>
+          </a:xfrm>
+          <a:prstGeom prst="rect">
+            <a:avLst/>
+          </a:prstGeom>
+          <a:ln>
+            <a:noFill/>
+          </a:ln>
+          <a:effectLst>
+            <a:outerShdw blurRad="292100" dist="139700" dir="2700000" algn="tl" rotWithShape="0">
+              <a:srgbClr val="333333">
+                <a:alpha val="65000"/>
+              </a:srgbClr>
+            </a:outerShdw>
+          </a:effectLst>
+          <a:extLst>
+            <a:ext uri="{909E8E84-426E-40DD-AFC4-6F175D3DCCD1}">
+              <a14:hiddenFill xmlns:a14="http://schemas.microsoft.com/office/drawing/2010/main">
+                <a:solidFill>
+                  <a:schemeClr val="accent1"/>
+                </a:solidFill>
+              </a14:hiddenFill>
+            </a:ext>
+            <a:ext uri="{91240B29-F687-4F45-9708-019B960494DF}">
+              <a14:hiddenLine xmlns:a14="http://schemas.microsoft.com/office/drawing/2010/main" w="9525">
+                <a:solidFill>
+                  <a:schemeClr val="tx1"/>
+                </a:solidFill>
+                <a:miter lim="800000"/>
+                <a:headEnd/>
+                <a:tailEnd/>
+              </a14:hiddenLine>
+            </a:ext>
+            <a:ext uri="{AF507438-7753-43E0-B8FC-AC1667EBCBE1}">
+              <a14:hiddenEffects xmlns:a14="http://schemas.microsoft.com/office/drawing/2010/main">
+                <a:effectLst>
+                  <a:outerShdw dist="35921" dir="2700000" algn="ctr" rotWithShape="0">
+                    <a:schemeClr val="bg2"/>
+                  </a:outerShdw>
+                </a:effectLst>
+              </a14:hiddenEffects>
+            </a:ext>
+          </a:extLst>
+        </p:spPr>
+      </p:pic>
+      <p:sp>
+        <p:nvSpPr>
+          <p:cNvPr id="4" name="TextBox 3"/>
+          <p:cNvSpPr txBox="1"/>
+          <p:nvPr/>
+        </p:nvSpPr>
+        <p:spPr>
+          <a:xfrm>
+            <a:off x="4577345" y="3537466"/>
+            <a:ext cx="791435" cy="369332"/>
+          </a:xfrm>
+          <a:prstGeom prst="rect">
+            <a:avLst/>
+          </a:prstGeom>
+          <a:noFill/>
+        </p:spPr>
+        <p:txBody>
+          <a:bodyPr wrap="none" rtlCol="0">
+            <a:spAutoFit/>
+          </a:bodyPr>
+          <a:lstStyle/>
+          <a:p>
+            <a:r>
+              <a:rPr lang="en-US" b="1" dirty="0" smtClean="0">
+                <a:solidFill>
+                  <a:srgbClr val="FF0000"/>
+                </a:solidFill>
+              </a:rPr>
+              <a:t>VIDEO</a:t>
+            </a:r>
+            <a:endParaRPr lang="en-US" b="1" dirty="0">
+              <a:solidFill>
+                <a:srgbClr val="FF0000"/>
+              </a:solidFill>
+            </a:endParaRPr>
+          </a:p>
+        </p:txBody>
+      </p:sp>
+      <p:sp>
+        <p:nvSpPr>
+          <p:cNvPr id="9" name="TextBox 8"/>
+          <p:cNvSpPr txBox="1"/>
+          <p:nvPr/>
+        </p:nvSpPr>
+        <p:spPr>
+          <a:xfrm>
+            <a:off x="2057400" y="1752600"/>
+            <a:ext cx="651140" cy="369332"/>
+          </a:xfrm>
+          <a:prstGeom prst="rect">
+            <a:avLst/>
+          </a:prstGeom>
+          <a:noFill/>
+        </p:spPr>
+        <p:txBody>
+          <a:bodyPr wrap="none" rtlCol="0">
+            <a:spAutoFit/>
+          </a:bodyPr>
+          <a:lstStyle/>
+          <a:p>
+            <a:r>
+              <a:rPr lang="en-US" b="1" dirty="0" smtClean="0">
+                <a:solidFill>
+                  <a:srgbClr val="FF0000"/>
+                </a:solidFill>
+              </a:rPr>
+              <a:t>TEXT</a:t>
+            </a:r>
+            <a:endParaRPr lang="en-US" b="1" dirty="0">
+              <a:solidFill>
+                <a:srgbClr val="FF0000"/>
+              </a:solidFill>
+            </a:endParaRPr>
+          </a:p>
+        </p:txBody>
+      </p:sp>
+      <p:sp>
+        <p:nvSpPr>
+          <p:cNvPr id="10" name="TextBox 9"/>
+          <p:cNvSpPr txBox="1"/>
+          <p:nvPr/>
+        </p:nvSpPr>
+        <p:spPr>
+          <a:xfrm>
+            <a:off x="7543800" y="2523183"/>
+            <a:ext cx="1425775" cy="369332"/>
+          </a:xfrm>
+          <a:prstGeom prst="rect">
+            <a:avLst/>
+          </a:prstGeom>
+          <a:noFill/>
+        </p:spPr>
+        <p:txBody>
+          <a:bodyPr wrap="none" rtlCol="0">
+            <a:spAutoFit/>
+          </a:bodyPr>
+          <a:lstStyle/>
+          <a:p>
+            <a:r>
+              <a:rPr lang="en-US" b="1" dirty="0" smtClean="0">
+                <a:solidFill>
+                  <a:srgbClr val="FF0000"/>
+                </a:solidFill>
+              </a:rPr>
+              <a:t>FILE / IMAGE</a:t>
+            </a:r>
+            <a:endParaRPr lang="en-US" b="1" dirty="0">
+              <a:solidFill>
+                <a:srgbClr val="FF0000"/>
+              </a:solidFill>
+            </a:endParaRPr>
+          </a:p>
+        </p:txBody>
+      </p:sp>
     </p:spTree>
     <p:extLst>
       <p:ext uri="{BB962C8B-B14F-4D97-AF65-F5344CB8AC3E}">
-        <p14:creationId xmlns:p14="http://schemas.microsoft.com/office/powerpoint/2010/main" val="966579281"/>
+        <p14:creationId xmlns:p14="http://schemas.microsoft.com/office/powerpoint/2010/main" val="388022056"/>
       </p:ext>
     </p:extLst>
   </p:cSld>
@@ -3384,7 +3582,7 @@
 </p:sld>
 </file>
 
-<file path=ppt/slides/slide3.xml><?xml version="1.0" encoding="utf-8"?>
+<file path=ppt/slides/slide11.xml><?xml version="1.0" encoding="utf-8"?>
 <p:sld xmlns:a="http://schemas.openxmlformats.org/drawingml/2006/main" xmlns:r="http://schemas.openxmlformats.org/officeDocument/2006/relationships" xmlns:p="http://schemas.openxmlformats.org/presentationml/2006/main">
   <p:cSld>
     <p:spTree>
@@ -3531,7 +3729,7 @@
 </p:sld>
 </file>
 
-<file path=ppt/slides/slide4.xml><?xml version="1.0" encoding="utf-8"?>
+<file path=ppt/slides/slide12.xml><?xml version="1.0" encoding="utf-8"?>
 <p:sld xmlns:a="http://schemas.openxmlformats.org/drawingml/2006/main" xmlns:r="http://schemas.openxmlformats.org/officeDocument/2006/relationships" xmlns:p="http://schemas.openxmlformats.org/presentationml/2006/main">
   <p:cSld>
     <p:spTree>
@@ -3674,6 +3872,833 @@
 </p:sld>
 </file>
 
+<file path=ppt/slides/slide13.xml><?xml version="1.0" encoding="utf-8"?>
+<p:sld xmlns:a="http://schemas.openxmlformats.org/drawingml/2006/main" xmlns:r="http://schemas.openxmlformats.org/officeDocument/2006/relationships" xmlns:p="http://schemas.openxmlformats.org/presentationml/2006/main">
+  <p:cSld>
+    <p:spTree>
+      <p:nvGrpSpPr>
+        <p:cNvPr id="1" name=""/>
+        <p:cNvGrpSpPr/>
+        <p:nvPr/>
+      </p:nvGrpSpPr>
+      <p:grpSpPr>
+        <a:xfrm>
+          <a:off x="0" y="0"/>
+          <a:ext cx="0" cy="0"/>
+          <a:chOff x="0" y="0"/>
+          <a:chExt cx="0" cy="0"/>
+        </a:xfrm>
+      </p:grpSpPr>
+      <p:sp>
+        <p:nvSpPr>
+          <p:cNvPr id="2" name="Title 1"/>
+          <p:cNvSpPr>
+            <a:spLocks noGrp="1"/>
+          </p:cNvSpPr>
+          <p:nvPr>
+            <p:ph type="title"/>
+          </p:nvPr>
+        </p:nvSpPr>
+        <p:spPr/>
+        <p:txBody>
+          <a:bodyPr/>
+          <a:lstStyle/>
+          <a:p>
+            <a:endParaRPr lang="en-US"/>
+          </a:p>
+        </p:txBody>
+      </p:sp>
+      <p:sp>
+        <p:nvSpPr>
+          <p:cNvPr id="3" name="Content Placeholder 2"/>
+          <p:cNvSpPr>
+            <a:spLocks noGrp="1"/>
+          </p:cNvSpPr>
+          <p:nvPr>
+            <p:ph idx="1"/>
+          </p:nvPr>
+        </p:nvSpPr>
+        <p:spPr/>
+        <p:txBody>
+          <a:bodyPr/>
+          <a:lstStyle/>
+          <a:p>
+            <a:endParaRPr lang="en-US"/>
+          </a:p>
+        </p:txBody>
+      </p:sp>
+      <p:pic>
+        <p:nvPicPr>
+          <p:cNvPr id="7170" name="Picture 2"/>
+          <p:cNvPicPr>
+            <a:picLocks noChangeAspect="1" noChangeArrowheads="1"/>
+          </p:cNvPicPr>
+          <p:nvPr/>
+        </p:nvPicPr>
+        <p:blipFill>
+          <a:blip r:embed="rId2">
+            <a:extLst>
+              <a:ext uri="{28A0092B-C50C-407E-A947-70E740481C1C}">
+                <a14:useLocalDpi xmlns:a14="http://schemas.microsoft.com/office/drawing/2010/main" val="0"/>
+              </a:ext>
+            </a:extLst>
+          </a:blip>
+          <a:srcRect/>
+          <a:stretch>
+            <a:fillRect/>
+          </a:stretch>
+        </p:blipFill>
+        <p:spPr bwMode="auto">
+          <a:xfrm>
+            <a:off x="0" y="1676400"/>
+            <a:ext cx="9191625" cy="4772025"/>
+          </a:xfrm>
+          <a:prstGeom prst="rect">
+            <a:avLst/>
+          </a:prstGeom>
+          <a:noFill/>
+          <a:ln>
+            <a:noFill/>
+          </a:ln>
+          <a:effectLst/>
+          <a:extLst>
+            <a:ext uri="{909E8E84-426E-40DD-AFC4-6F175D3DCCD1}">
+              <a14:hiddenFill xmlns:a14="http://schemas.microsoft.com/office/drawing/2010/main">
+                <a:solidFill>
+                  <a:schemeClr val="accent1"/>
+                </a:solidFill>
+              </a14:hiddenFill>
+            </a:ext>
+            <a:ext uri="{91240B29-F687-4F45-9708-019B960494DF}">
+              <a14:hiddenLine xmlns:a14="http://schemas.microsoft.com/office/drawing/2010/main" w="9525">
+                <a:solidFill>
+                  <a:schemeClr val="tx1"/>
+                </a:solidFill>
+                <a:miter lim="800000"/>
+                <a:headEnd/>
+                <a:tailEnd/>
+              </a14:hiddenLine>
+            </a:ext>
+            <a:ext uri="{AF507438-7753-43E0-B8FC-AC1667EBCBE1}">
+              <a14:hiddenEffects xmlns:a14="http://schemas.microsoft.com/office/drawing/2010/main">
+                <a:effectLst>
+                  <a:outerShdw dist="35921" dir="2700000" algn="ctr" rotWithShape="0">
+                    <a:schemeClr val="bg2"/>
+                  </a:outerShdw>
+                </a:effectLst>
+              </a14:hiddenEffects>
+            </a:ext>
+          </a:extLst>
+        </p:spPr>
+      </p:pic>
+    </p:spTree>
+    <p:extLst>
+      <p:ext uri="{BB962C8B-B14F-4D97-AF65-F5344CB8AC3E}">
+        <p14:creationId xmlns:p14="http://schemas.microsoft.com/office/powerpoint/2010/main" val="1117490252"/>
+      </p:ext>
+    </p:extLst>
+  </p:cSld>
+  <p:clrMapOvr>
+    <a:masterClrMapping/>
+  </p:clrMapOvr>
+  <p:timing>
+    <p:tnLst>
+      <p:par>
+        <p:cTn id="1" dur="indefinite" restart="never" nodeType="tmRoot"/>
+      </p:par>
+    </p:tnLst>
+  </p:timing>
+</p:sld>
+</file>
+
+<file path=ppt/slides/slide14.xml><?xml version="1.0" encoding="utf-8"?>
+<p:sld xmlns:a="http://schemas.openxmlformats.org/drawingml/2006/main" xmlns:r="http://schemas.openxmlformats.org/officeDocument/2006/relationships" xmlns:p="http://schemas.openxmlformats.org/presentationml/2006/main">
+  <p:cSld>
+    <p:spTree>
+      <p:nvGrpSpPr>
+        <p:cNvPr id="1" name=""/>
+        <p:cNvGrpSpPr/>
+        <p:nvPr/>
+      </p:nvGrpSpPr>
+      <p:grpSpPr>
+        <a:xfrm>
+          <a:off x="0" y="0"/>
+          <a:ext cx="0" cy="0"/>
+          <a:chOff x="0" y="0"/>
+          <a:chExt cx="0" cy="0"/>
+        </a:xfrm>
+      </p:grpSpPr>
+      <p:sp>
+        <p:nvSpPr>
+          <p:cNvPr id="2" name="Title 1"/>
+          <p:cNvSpPr>
+            <a:spLocks noGrp="1"/>
+          </p:cNvSpPr>
+          <p:nvPr>
+            <p:ph type="title"/>
+          </p:nvPr>
+        </p:nvSpPr>
+        <p:spPr/>
+        <p:txBody>
+          <a:bodyPr/>
+          <a:lstStyle/>
+          <a:p>
+            <a:r>
+              <a:rPr lang="en-US" dirty="0" err="1" smtClean="0"/>
+              <a:t>Cần</a:t>
+            </a:r>
+            <a:r>
+              <a:rPr lang="en-US" dirty="0" smtClean="0"/>
+              <a:t> </a:t>
+            </a:r>
+            <a:r>
+              <a:rPr lang="en-US" dirty="0" err="1" smtClean="0"/>
+              <a:t>giải</a:t>
+            </a:r>
+            <a:r>
+              <a:rPr lang="en-US" dirty="0" smtClean="0"/>
+              <a:t> </a:t>
+            </a:r>
+            <a:r>
+              <a:rPr lang="en-US" dirty="0" err="1" smtClean="0"/>
+              <a:t>quyết</a:t>
+            </a:r>
+            <a:endParaRPr lang="en-US" dirty="0"/>
+          </a:p>
+        </p:txBody>
+      </p:sp>
+      <p:sp>
+        <p:nvSpPr>
+          <p:cNvPr id="3" name="Content Placeholder 2"/>
+          <p:cNvSpPr>
+            <a:spLocks noGrp="1"/>
+          </p:cNvSpPr>
+          <p:nvPr>
+            <p:ph idx="1"/>
+          </p:nvPr>
+        </p:nvSpPr>
+        <p:spPr/>
+        <p:txBody>
+          <a:bodyPr/>
+          <a:lstStyle/>
+          <a:p>
+            <a:r>
+              <a:rPr lang="en-US" dirty="0" smtClean="0"/>
+              <a:t>Multi types users</a:t>
+            </a:r>
+          </a:p>
+          <a:p>
+            <a:r>
+              <a:rPr lang="en-US" dirty="0" err="1" smtClean="0"/>
+              <a:t>Bài</a:t>
+            </a:r>
+            <a:r>
+              <a:rPr lang="en-US" dirty="0" smtClean="0"/>
+              <a:t> </a:t>
+            </a:r>
+            <a:r>
+              <a:rPr lang="en-US" dirty="0" err="1" smtClean="0"/>
+              <a:t>tập</a:t>
+            </a:r>
+            <a:r>
+              <a:rPr lang="en-US" dirty="0" smtClean="0"/>
+              <a:t> </a:t>
+            </a:r>
+          </a:p>
+          <a:p>
+            <a:r>
+              <a:rPr lang="en-US" dirty="0" err="1" smtClean="0"/>
+              <a:t>Hỏi</a:t>
+            </a:r>
+            <a:r>
+              <a:rPr lang="en-US" dirty="0" smtClean="0"/>
+              <a:t> </a:t>
+            </a:r>
+            <a:r>
+              <a:rPr lang="en-US" dirty="0" err="1" smtClean="0"/>
+              <a:t>đáp</a:t>
+            </a:r>
+            <a:endParaRPr lang="en-US" dirty="0" smtClean="0"/>
+          </a:p>
+          <a:p>
+            <a:r>
+              <a:rPr lang="en-US" smtClean="0"/>
+              <a:t>Quiz</a:t>
+            </a:r>
+          </a:p>
+        </p:txBody>
+      </p:sp>
+    </p:spTree>
+    <p:extLst>
+      <p:ext uri="{BB962C8B-B14F-4D97-AF65-F5344CB8AC3E}">
+        <p14:creationId xmlns:p14="http://schemas.microsoft.com/office/powerpoint/2010/main" val="658030801"/>
+      </p:ext>
+    </p:extLst>
+  </p:cSld>
+  <p:clrMapOvr>
+    <a:masterClrMapping/>
+  </p:clrMapOvr>
+  <p:timing>
+    <p:tnLst>
+      <p:par>
+        <p:cTn id="1" dur="indefinite" restart="never" nodeType="tmRoot"/>
+      </p:par>
+    </p:tnLst>
+  </p:timing>
+</p:sld>
+</file>
+
+<file path=ppt/slides/slide2.xml><?xml version="1.0" encoding="utf-8"?>
+<p:sld xmlns:a="http://schemas.openxmlformats.org/drawingml/2006/main" xmlns:r="http://schemas.openxmlformats.org/officeDocument/2006/relationships" xmlns:p="http://schemas.openxmlformats.org/presentationml/2006/main">
+  <p:cSld>
+    <p:spTree>
+      <p:nvGrpSpPr>
+        <p:cNvPr id="1" name=""/>
+        <p:cNvGrpSpPr/>
+        <p:nvPr/>
+      </p:nvGrpSpPr>
+      <p:grpSpPr>
+        <a:xfrm>
+          <a:off x="0" y="0"/>
+          <a:ext cx="0" cy="0"/>
+          <a:chOff x="0" y="0"/>
+          <a:chExt cx="0" cy="0"/>
+        </a:xfrm>
+      </p:grpSpPr>
+      <p:sp>
+        <p:nvSpPr>
+          <p:cNvPr id="2" name="Title 1"/>
+          <p:cNvSpPr>
+            <a:spLocks noGrp="1"/>
+          </p:cNvSpPr>
+          <p:nvPr>
+            <p:ph type="title"/>
+          </p:nvPr>
+        </p:nvSpPr>
+        <p:spPr>
+          <a:xfrm>
+            <a:off x="457200" y="-152400"/>
+            <a:ext cx="8229600" cy="1143000"/>
+          </a:xfrm>
+        </p:spPr>
+        <p:txBody>
+          <a:bodyPr/>
+          <a:lstStyle/>
+          <a:p>
+            <a:r>
+              <a:rPr lang="en-US" dirty="0" err="1" smtClean="0"/>
+              <a:t>Trang</a:t>
+            </a:r>
+            <a:r>
+              <a:rPr lang="en-US" dirty="0" smtClean="0"/>
+              <a:t> </a:t>
+            </a:r>
+            <a:r>
+              <a:rPr lang="en-US" dirty="0" err="1" smtClean="0"/>
+              <a:t>chu</a:t>
+            </a:r>
+            <a:endParaRPr lang="en-US" dirty="0"/>
+          </a:p>
+        </p:txBody>
+      </p:sp>
+      <p:sp>
+        <p:nvSpPr>
+          <p:cNvPr id="3" name="Content Placeholder 2"/>
+          <p:cNvSpPr>
+            <a:spLocks noGrp="1"/>
+          </p:cNvSpPr>
+          <p:nvPr>
+            <p:ph idx="1"/>
+          </p:nvPr>
+        </p:nvSpPr>
+        <p:spPr/>
+        <p:txBody>
+          <a:bodyPr/>
+          <a:lstStyle/>
+          <a:p>
+            <a:endParaRPr lang="en-US"/>
+          </a:p>
+        </p:txBody>
+      </p:sp>
+      <p:pic>
+        <p:nvPicPr>
+          <p:cNvPr id="2051" name="Picture 3"/>
+          <p:cNvPicPr>
+            <a:picLocks noChangeAspect="1" noChangeArrowheads="1"/>
+          </p:cNvPicPr>
+          <p:nvPr/>
+        </p:nvPicPr>
+        <p:blipFill>
+          <a:blip r:embed="rId2">
+            <a:extLst>
+              <a:ext uri="{28A0092B-C50C-407E-A947-70E740481C1C}">
+                <a14:useLocalDpi xmlns:a14="http://schemas.microsoft.com/office/drawing/2010/main" val="0"/>
+              </a:ext>
+            </a:extLst>
+          </a:blip>
+          <a:srcRect/>
+          <a:stretch>
+            <a:fillRect/>
+          </a:stretch>
+        </p:blipFill>
+        <p:spPr bwMode="auto">
+          <a:xfrm>
+            <a:off x="733425" y="790575"/>
+            <a:ext cx="7677150" cy="6067425"/>
+          </a:xfrm>
+          <a:prstGeom prst="rect">
+            <a:avLst/>
+          </a:prstGeom>
+          <a:noFill/>
+          <a:ln>
+            <a:noFill/>
+          </a:ln>
+          <a:effectLst/>
+          <a:extLst>
+            <a:ext uri="{909E8E84-426E-40DD-AFC4-6F175D3DCCD1}">
+              <a14:hiddenFill xmlns:a14="http://schemas.microsoft.com/office/drawing/2010/main">
+                <a:solidFill>
+                  <a:schemeClr val="accent1"/>
+                </a:solidFill>
+              </a14:hiddenFill>
+            </a:ext>
+            <a:ext uri="{91240B29-F687-4F45-9708-019B960494DF}">
+              <a14:hiddenLine xmlns:a14="http://schemas.microsoft.com/office/drawing/2010/main" w="9525">
+                <a:solidFill>
+                  <a:schemeClr val="tx1"/>
+                </a:solidFill>
+                <a:miter lim="800000"/>
+                <a:headEnd/>
+                <a:tailEnd/>
+              </a14:hiddenLine>
+            </a:ext>
+            <a:ext uri="{AF507438-7753-43E0-B8FC-AC1667EBCBE1}">
+              <a14:hiddenEffects xmlns:a14="http://schemas.microsoft.com/office/drawing/2010/main">
+                <a:effectLst>
+                  <a:outerShdw dist="35921" dir="2700000" algn="ctr" rotWithShape="0">
+                    <a:schemeClr val="bg2"/>
+                  </a:outerShdw>
+                </a:effectLst>
+              </a14:hiddenEffects>
+            </a:ext>
+          </a:extLst>
+        </p:spPr>
+      </p:pic>
+    </p:spTree>
+    <p:extLst>
+      <p:ext uri="{BB962C8B-B14F-4D97-AF65-F5344CB8AC3E}">
+        <p14:creationId xmlns:p14="http://schemas.microsoft.com/office/powerpoint/2010/main" val="2185092202"/>
+      </p:ext>
+    </p:extLst>
+  </p:cSld>
+  <p:clrMapOvr>
+    <a:masterClrMapping/>
+  </p:clrMapOvr>
+  <p:timing>
+    <p:tnLst>
+      <p:par>
+        <p:cTn id="1" dur="indefinite" restart="never" nodeType="tmRoot"/>
+      </p:par>
+    </p:tnLst>
+  </p:timing>
+</p:sld>
+</file>
+
+<file path=ppt/slides/slide3.xml><?xml version="1.0" encoding="utf-8"?>
+<p:sld xmlns:a="http://schemas.openxmlformats.org/drawingml/2006/main" xmlns:r="http://schemas.openxmlformats.org/officeDocument/2006/relationships" xmlns:p="http://schemas.openxmlformats.org/presentationml/2006/main">
+  <p:cSld>
+    <p:spTree>
+      <p:nvGrpSpPr>
+        <p:cNvPr id="1" name=""/>
+        <p:cNvGrpSpPr/>
+        <p:nvPr/>
+      </p:nvGrpSpPr>
+      <p:grpSpPr>
+        <a:xfrm>
+          <a:off x="0" y="0"/>
+          <a:ext cx="0" cy="0"/>
+          <a:chOff x="0" y="0"/>
+          <a:chExt cx="0" cy="0"/>
+        </a:xfrm>
+      </p:grpSpPr>
+      <p:sp>
+        <p:nvSpPr>
+          <p:cNvPr id="2" name="Title 1"/>
+          <p:cNvSpPr>
+            <a:spLocks noGrp="1"/>
+          </p:cNvSpPr>
+          <p:nvPr>
+            <p:ph type="title"/>
+          </p:nvPr>
+        </p:nvSpPr>
+        <p:spPr/>
+        <p:txBody>
+          <a:bodyPr/>
+          <a:lstStyle/>
+          <a:p>
+            <a:r>
+              <a:rPr lang="en-US" dirty="0" err="1" smtClean="0"/>
+              <a:t>Trang</a:t>
+            </a:r>
+            <a:r>
+              <a:rPr lang="en-US" dirty="0" smtClean="0"/>
+              <a:t> </a:t>
+            </a:r>
+            <a:r>
+              <a:rPr lang="en-US" dirty="0" err="1" smtClean="0"/>
+              <a:t>chủ</a:t>
+            </a:r>
+            <a:endParaRPr lang="en-US" dirty="0"/>
+          </a:p>
+        </p:txBody>
+      </p:sp>
+      <p:sp>
+        <p:nvSpPr>
+          <p:cNvPr id="3" name="Content Placeholder 2"/>
+          <p:cNvSpPr>
+            <a:spLocks noGrp="1"/>
+          </p:cNvSpPr>
+          <p:nvPr>
+            <p:ph idx="1"/>
+          </p:nvPr>
+        </p:nvSpPr>
+        <p:spPr>
+          <a:xfrm>
+            <a:off x="457200" y="1600200"/>
+            <a:ext cx="3048000" cy="4525963"/>
+          </a:xfrm>
+        </p:spPr>
+        <p:txBody>
+          <a:bodyPr/>
+          <a:lstStyle/>
+          <a:p>
+            <a:r>
+              <a:rPr lang="en-US" dirty="0" err="1" smtClean="0"/>
+              <a:t>Để</a:t>
+            </a:r>
+            <a:r>
+              <a:rPr lang="en-US" dirty="0" smtClean="0"/>
+              <a:t> </a:t>
+            </a:r>
+            <a:r>
+              <a:rPr lang="en-US" dirty="0" err="1" smtClean="0"/>
+              <a:t>xem</a:t>
+            </a:r>
+            <a:r>
+              <a:rPr lang="en-US" dirty="0" smtClean="0"/>
+              <a:t> </a:t>
+            </a:r>
+            <a:r>
+              <a:rPr lang="en-US" dirty="0" err="1" smtClean="0"/>
+              <a:t>nội</a:t>
+            </a:r>
+            <a:r>
+              <a:rPr lang="en-US" dirty="0" smtClean="0"/>
+              <a:t> dung </a:t>
+            </a:r>
+            <a:r>
+              <a:rPr lang="en-US" dirty="0" err="1" smtClean="0"/>
+              <a:t>cần</a:t>
+            </a:r>
+            <a:r>
+              <a:rPr lang="en-US" dirty="0" smtClean="0"/>
+              <a:t> </a:t>
+            </a:r>
+            <a:r>
+              <a:rPr lang="en-US" dirty="0" err="1" smtClean="0"/>
+              <a:t>đăng</a:t>
+            </a:r>
+            <a:r>
+              <a:rPr lang="en-US" dirty="0" smtClean="0"/>
+              <a:t> </a:t>
+            </a:r>
+            <a:r>
+              <a:rPr lang="en-US" dirty="0" err="1" smtClean="0"/>
+              <a:t>nhập</a:t>
+            </a:r>
+            <a:endParaRPr lang="en-US" dirty="0"/>
+          </a:p>
+        </p:txBody>
+      </p:sp>
+      <p:pic>
+        <p:nvPicPr>
+          <p:cNvPr id="3074" name="Picture 2"/>
+          <p:cNvPicPr>
+            <a:picLocks noChangeAspect="1" noChangeArrowheads="1"/>
+          </p:cNvPicPr>
+          <p:nvPr/>
+        </p:nvPicPr>
+        <p:blipFill>
+          <a:blip r:embed="rId2">
+            <a:extLst>
+              <a:ext uri="{28A0092B-C50C-407E-A947-70E740481C1C}">
+                <a14:useLocalDpi xmlns:a14="http://schemas.microsoft.com/office/drawing/2010/main" val="0"/>
+              </a:ext>
+            </a:extLst>
+          </a:blip>
+          <a:srcRect/>
+          <a:stretch>
+            <a:fillRect/>
+          </a:stretch>
+        </p:blipFill>
+        <p:spPr bwMode="auto">
+          <a:xfrm>
+            <a:off x="3505200" y="1742768"/>
+            <a:ext cx="5362575" cy="4600575"/>
+          </a:xfrm>
+          <a:prstGeom prst="rect">
+            <a:avLst/>
+          </a:prstGeom>
+          <a:noFill/>
+          <a:ln>
+            <a:noFill/>
+          </a:ln>
+          <a:effectLst/>
+          <a:extLst>
+            <a:ext uri="{909E8E84-426E-40DD-AFC4-6F175D3DCCD1}">
+              <a14:hiddenFill xmlns:a14="http://schemas.microsoft.com/office/drawing/2010/main">
+                <a:solidFill>
+                  <a:schemeClr val="accent1"/>
+                </a:solidFill>
+              </a14:hiddenFill>
+            </a:ext>
+            <a:ext uri="{91240B29-F687-4F45-9708-019B960494DF}">
+              <a14:hiddenLine xmlns:a14="http://schemas.microsoft.com/office/drawing/2010/main" w="9525">
+                <a:solidFill>
+                  <a:schemeClr val="tx1"/>
+                </a:solidFill>
+                <a:miter lim="800000"/>
+                <a:headEnd/>
+                <a:tailEnd/>
+              </a14:hiddenLine>
+            </a:ext>
+            <a:ext uri="{AF507438-7753-43E0-B8FC-AC1667EBCBE1}">
+              <a14:hiddenEffects xmlns:a14="http://schemas.microsoft.com/office/drawing/2010/main">
+                <a:effectLst>
+                  <a:outerShdw dist="35921" dir="2700000" algn="ctr" rotWithShape="0">
+                    <a:schemeClr val="bg2"/>
+                  </a:outerShdw>
+                </a:effectLst>
+              </a14:hiddenEffects>
+            </a:ext>
+          </a:extLst>
+        </p:spPr>
+      </p:pic>
+    </p:spTree>
+    <p:extLst>
+      <p:ext uri="{BB962C8B-B14F-4D97-AF65-F5344CB8AC3E}">
+        <p14:creationId xmlns:p14="http://schemas.microsoft.com/office/powerpoint/2010/main" val="498126222"/>
+      </p:ext>
+    </p:extLst>
+  </p:cSld>
+  <p:clrMapOvr>
+    <a:masterClrMapping/>
+  </p:clrMapOvr>
+  <p:timing>
+    <p:tnLst>
+      <p:par>
+        <p:cTn id="1" dur="indefinite" restart="never" nodeType="tmRoot"/>
+      </p:par>
+    </p:tnLst>
+  </p:timing>
+</p:sld>
+</file>
+
+<file path=ppt/slides/slide4.xml><?xml version="1.0" encoding="utf-8"?>
+<p:sld xmlns:a="http://schemas.openxmlformats.org/drawingml/2006/main" xmlns:r="http://schemas.openxmlformats.org/officeDocument/2006/relationships" xmlns:p="http://schemas.openxmlformats.org/presentationml/2006/main">
+  <p:cSld>
+    <p:spTree>
+      <p:nvGrpSpPr>
+        <p:cNvPr id="1" name=""/>
+        <p:cNvGrpSpPr/>
+        <p:nvPr/>
+      </p:nvGrpSpPr>
+      <p:grpSpPr>
+        <a:xfrm>
+          <a:off x="0" y="0"/>
+          <a:ext cx="0" cy="0"/>
+          <a:chOff x="0" y="0"/>
+          <a:chExt cx="0" cy="0"/>
+        </a:xfrm>
+      </p:grpSpPr>
+      <p:sp>
+        <p:nvSpPr>
+          <p:cNvPr id="2" name="Title 1"/>
+          <p:cNvSpPr>
+            <a:spLocks noGrp="1"/>
+          </p:cNvSpPr>
+          <p:nvPr>
+            <p:ph type="title"/>
+          </p:nvPr>
+        </p:nvSpPr>
+        <p:spPr/>
+        <p:txBody>
+          <a:bodyPr/>
+          <a:lstStyle/>
+          <a:p>
+            <a:r>
+              <a:rPr lang="en-US" dirty="0" err="1" smtClean="0"/>
+              <a:t>Người</a:t>
+            </a:r>
+            <a:r>
+              <a:rPr lang="en-US" dirty="0" smtClean="0"/>
+              <a:t> </a:t>
+            </a:r>
+            <a:r>
+              <a:rPr lang="en-US" dirty="0" err="1" smtClean="0"/>
+              <a:t>học</a:t>
+            </a:r>
+            <a:r>
+              <a:rPr lang="en-US" dirty="0" smtClean="0"/>
+              <a:t> </a:t>
+            </a:r>
+            <a:r>
+              <a:rPr lang="en-US" dirty="0" err="1" smtClean="0"/>
+              <a:t>đăng</a:t>
+            </a:r>
+            <a:r>
+              <a:rPr lang="en-US" dirty="0" smtClean="0"/>
+              <a:t> </a:t>
+            </a:r>
+            <a:r>
+              <a:rPr lang="en-US" dirty="0" err="1" smtClean="0"/>
+              <a:t>ký</a:t>
+            </a:r>
+            <a:endParaRPr lang="en-US" dirty="0"/>
+          </a:p>
+        </p:txBody>
+      </p:sp>
+      <p:sp>
+        <p:nvSpPr>
+          <p:cNvPr id="3" name="Content Placeholder 2"/>
+          <p:cNvSpPr>
+            <a:spLocks noGrp="1"/>
+          </p:cNvSpPr>
+          <p:nvPr>
+            <p:ph idx="1"/>
+          </p:nvPr>
+        </p:nvSpPr>
+        <p:spPr/>
+        <p:txBody>
+          <a:bodyPr/>
+          <a:lstStyle/>
+          <a:p>
+            <a:endParaRPr lang="en-US" dirty="0"/>
+          </a:p>
+        </p:txBody>
+      </p:sp>
+      <p:sp>
+        <p:nvSpPr>
+          <p:cNvPr id="4" name="Rectangle 3"/>
+          <p:cNvSpPr/>
+          <p:nvPr/>
+        </p:nvSpPr>
+        <p:spPr>
+          <a:xfrm>
+            <a:off x="2628102" y="3244334"/>
+            <a:ext cx="3887796" cy="369332"/>
+          </a:xfrm>
+          <a:prstGeom prst="rect">
+            <a:avLst/>
+          </a:prstGeom>
+        </p:spPr>
+        <p:txBody>
+          <a:bodyPr wrap="none">
+            <a:spAutoFit/>
+          </a:bodyPr>
+          <a:lstStyle/>
+          <a:p>
+            <a:r>
+              <a:rPr lang="en-US" dirty="0"/>
+              <a:t>http://localhost:8000/student/register/</a:t>
+            </a:r>
+          </a:p>
+        </p:txBody>
+      </p:sp>
+      <p:pic>
+        <p:nvPicPr>
+          <p:cNvPr id="8194" name="Picture 2"/>
+          <p:cNvPicPr>
+            <a:picLocks noChangeAspect="1" noChangeArrowheads="1"/>
+          </p:cNvPicPr>
+          <p:nvPr/>
+        </p:nvPicPr>
+        <p:blipFill>
+          <a:blip r:embed="rId2">
+            <a:extLst>
+              <a:ext uri="{28A0092B-C50C-407E-A947-70E740481C1C}">
+                <a14:useLocalDpi xmlns:a14="http://schemas.microsoft.com/office/drawing/2010/main" val="0"/>
+              </a:ext>
+            </a:extLst>
+          </a:blip>
+          <a:srcRect/>
+          <a:stretch>
+            <a:fillRect/>
+          </a:stretch>
+        </p:blipFill>
+        <p:spPr bwMode="auto">
+          <a:xfrm>
+            <a:off x="2279536" y="1524000"/>
+            <a:ext cx="4530839" cy="5304192"/>
+          </a:xfrm>
+          <a:prstGeom prst="rect">
+            <a:avLst/>
+          </a:prstGeom>
+          <a:noFill/>
+          <a:ln>
+            <a:noFill/>
+          </a:ln>
+          <a:effectLst/>
+          <a:extLst>
+            <a:ext uri="{909E8E84-426E-40DD-AFC4-6F175D3DCCD1}">
+              <a14:hiddenFill xmlns:a14="http://schemas.microsoft.com/office/drawing/2010/main">
+                <a:solidFill>
+                  <a:schemeClr val="accent1"/>
+                </a:solidFill>
+              </a14:hiddenFill>
+            </a:ext>
+            <a:ext uri="{91240B29-F687-4F45-9708-019B960494DF}">
+              <a14:hiddenLine xmlns:a14="http://schemas.microsoft.com/office/drawing/2010/main" w="9525">
+                <a:solidFill>
+                  <a:schemeClr val="tx1"/>
+                </a:solidFill>
+                <a:miter lim="800000"/>
+                <a:headEnd/>
+                <a:tailEnd/>
+              </a14:hiddenLine>
+            </a:ext>
+            <a:ext uri="{AF507438-7753-43E0-B8FC-AC1667EBCBE1}">
+              <a14:hiddenEffects xmlns:a14="http://schemas.microsoft.com/office/drawing/2010/main">
+                <a:effectLst>
+                  <a:outerShdw dist="35921" dir="2700000" algn="ctr" rotWithShape="0">
+                    <a:schemeClr val="bg2"/>
+                  </a:outerShdw>
+                </a:effectLst>
+              </a14:hiddenEffects>
+            </a:ext>
+          </a:extLst>
+        </p:spPr>
+      </p:pic>
+    </p:spTree>
+    <p:extLst>
+      <p:ext uri="{BB962C8B-B14F-4D97-AF65-F5344CB8AC3E}">
+        <p14:creationId xmlns:p14="http://schemas.microsoft.com/office/powerpoint/2010/main" val="4070608560"/>
+      </p:ext>
+    </p:extLst>
+  </p:cSld>
+  <p:clrMapOvr>
+    <a:masterClrMapping/>
+  </p:clrMapOvr>
+  <p:timing>
+    <p:tnLst>
+      <p:par>
+        <p:cTn id="1" dur="indefinite" restart="never" nodeType="tmRoot"/>
+      </p:par>
+    </p:tnLst>
+  </p:timing>
+</p:sld>
+</file>
+
 <file path=ppt/slides/slide5.xml><?xml version="1.0" encoding="utf-8"?>
 <p:sld xmlns:a="http://schemas.openxmlformats.org/drawingml/2006/main" xmlns:r="http://schemas.openxmlformats.org/officeDocument/2006/relationships" xmlns:p="http://schemas.openxmlformats.org/presentationml/2006/main">
   <p:cSld>
@@ -3706,6 +4731,18 @@
           <a:bodyPr/>
           <a:lstStyle/>
           <a:p>
+            <a:r>
+              <a:rPr lang="en-US" dirty="0" err="1" smtClean="0"/>
+              <a:t>Người</a:t>
+            </a:r>
+            <a:r>
+              <a:rPr lang="en-US" dirty="0" smtClean="0"/>
+              <a:t> </a:t>
+            </a:r>
+            <a:r>
+              <a:rPr lang="en-US" dirty="0" err="1" smtClean="0"/>
+              <a:t>học</a:t>
+            </a:r>
             <a:endParaRPr lang="en-US" dirty="0"/>
           </a:p>
         </p:txBody>
@@ -3729,10 +4766,74 @@
           </a:p>
         </p:txBody>
       </p:sp>
+      <p:pic>
+        <p:nvPicPr>
+          <p:cNvPr id="1026" name="Picture 2"/>
+          <p:cNvPicPr>
+            <a:picLocks noChangeAspect="1" noChangeArrowheads="1"/>
+          </p:cNvPicPr>
+          <p:nvPr/>
+        </p:nvPicPr>
+        <p:blipFill>
+          <a:blip r:embed="rId2">
+            <a:extLst>
+              <a:ext uri="{28A0092B-C50C-407E-A947-70E740481C1C}">
+                <a14:useLocalDpi xmlns:a14="http://schemas.microsoft.com/office/drawing/2010/main" val="0"/>
+              </a:ext>
+            </a:extLst>
+          </a:blip>
+          <a:srcRect/>
+          <a:stretch>
+            <a:fillRect/>
+          </a:stretch>
+        </p:blipFill>
+        <p:spPr bwMode="auto">
+          <a:xfrm>
+            <a:off x="762000" y="1600200"/>
+            <a:ext cx="4248150" cy="4314825"/>
+          </a:xfrm>
+          <a:prstGeom prst="rect">
+            <a:avLst/>
+          </a:prstGeom>
+          <a:noFill/>
+          <a:ln>
+            <a:noFill/>
+          </a:ln>
+          <a:effectLst/>
+          <a:extLst>
+            <a:ext uri="{909E8E84-426E-40DD-AFC4-6F175D3DCCD1}">
+              <a14:hiddenFill xmlns:a14="http://schemas.microsoft.com/office/drawing/2010/main">
+                <a:solidFill>
+                  <a:schemeClr val="accent1"/>
+                </a:solidFill>
+              </a14:hiddenFill>
+            </a:ext>
+            <a:ext uri="{91240B29-F687-4F45-9708-019B960494DF}">
+              <a14:hiddenLine xmlns:a14="http://schemas.microsoft.com/office/drawing/2010/main" w="9525">
+                <a:solidFill>
+                  <a:schemeClr val="tx1"/>
+                </a:solidFill>
+                <a:miter lim="800000"/>
+                <a:headEnd/>
+                <a:tailEnd/>
+              </a14:hiddenLine>
+            </a:ext>
+            <a:ext uri="{AF507438-7753-43E0-B8FC-AC1667EBCBE1}">
+              <a14:hiddenEffects xmlns:a14="http://schemas.microsoft.com/office/drawing/2010/main">
+                <a:effectLst>
+                  <a:outerShdw dist="35921" dir="2700000" algn="ctr" rotWithShape="0">
+                    <a:schemeClr val="bg2"/>
+                  </a:outerShdw>
+                </a:effectLst>
+              </a14:hiddenEffects>
+            </a:ext>
+          </a:extLst>
+        </p:spPr>
+      </p:pic>
     </p:spTree>
     <p:extLst>
       <p:ext uri="{BB962C8B-B14F-4D97-AF65-F5344CB8AC3E}">
-        <p14:creationId xmlns:p14="http://schemas.microsoft.com/office/powerpoint/2010/main" val="1655604765"/>
+        <p14:creationId xmlns:p14="http://schemas.microsoft.com/office/powerpoint/2010/main" val="2468084674"/>
       </p:ext>
     </p:extLst>
   </p:cSld>
@@ -3781,7 +4882,19 @@
           <a:bodyPr/>
           <a:lstStyle/>
           <a:p>
-            <a:endParaRPr lang="en-US"/>
+            <a:r>
+              <a:rPr lang="en-US" dirty="0" err="1" smtClean="0"/>
+              <a:t>Người</a:t>
+            </a:r>
+            <a:r>
+              <a:rPr lang="en-US" dirty="0" smtClean="0"/>
+              <a:t> </a:t>
+            </a:r>
+            <a:r>
+              <a:rPr lang="en-US" dirty="0" err="1" smtClean="0"/>
+              <a:t>học</a:t>
+            </a:r>
+            <a:endParaRPr lang="en-US" dirty="0"/>
           </a:p>
         </p:txBody>
       </p:sp>
@@ -3804,10 +4917,74 @@
           </a:p>
         </p:txBody>
       </p:sp>
+      <p:pic>
+        <p:nvPicPr>
+          <p:cNvPr id="4098" name="Picture 2"/>
+          <p:cNvPicPr>
+            <a:picLocks noChangeAspect="1" noChangeArrowheads="1"/>
+          </p:cNvPicPr>
+          <p:nvPr/>
+        </p:nvPicPr>
+        <p:blipFill>
+          <a:blip r:embed="rId2">
+            <a:extLst>
+              <a:ext uri="{28A0092B-C50C-407E-A947-70E740481C1C}">
+                <a14:useLocalDpi xmlns:a14="http://schemas.microsoft.com/office/drawing/2010/main" val="0"/>
+              </a:ext>
+            </a:extLst>
+          </a:blip>
+          <a:srcRect/>
+          <a:stretch>
+            <a:fillRect/>
+          </a:stretch>
+        </p:blipFill>
+        <p:spPr bwMode="auto">
+          <a:xfrm>
+            <a:off x="304800" y="1752600"/>
+            <a:ext cx="8610600" cy="4669770"/>
+          </a:xfrm>
+          <a:prstGeom prst="rect">
+            <a:avLst/>
+          </a:prstGeom>
+          <a:noFill/>
+          <a:ln>
+            <a:noFill/>
+          </a:ln>
+          <a:effectLst/>
+          <a:extLst>
+            <a:ext uri="{909E8E84-426E-40DD-AFC4-6F175D3DCCD1}">
+              <a14:hiddenFill xmlns:a14="http://schemas.microsoft.com/office/drawing/2010/main">
+                <a:solidFill>
+                  <a:schemeClr val="accent1"/>
+                </a:solidFill>
+              </a14:hiddenFill>
+            </a:ext>
+            <a:ext uri="{91240B29-F687-4F45-9708-019B960494DF}">
+              <a14:hiddenLine xmlns:a14="http://schemas.microsoft.com/office/drawing/2010/main" w="9525">
+                <a:solidFill>
+                  <a:schemeClr val="tx1"/>
+                </a:solidFill>
+                <a:miter lim="800000"/>
+                <a:headEnd/>
+                <a:tailEnd/>
+              </a14:hiddenLine>
+            </a:ext>
+            <a:ext uri="{AF507438-7753-43E0-B8FC-AC1667EBCBE1}">
+              <a14:hiddenEffects xmlns:a14="http://schemas.microsoft.com/office/drawing/2010/main">
+                <a:effectLst>
+                  <a:outerShdw dist="35921" dir="2700000" algn="ctr" rotWithShape="0">
+                    <a:schemeClr val="bg2"/>
+                  </a:outerShdw>
+                </a:effectLst>
+              </a14:hiddenEffects>
+            </a:ext>
+          </a:extLst>
+        </p:spPr>
+      </p:pic>
     </p:spTree>
     <p:extLst>
       <p:ext uri="{BB962C8B-B14F-4D97-AF65-F5344CB8AC3E}">
-        <p14:creationId xmlns:p14="http://schemas.microsoft.com/office/powerpoint/2010/main" val="3081472930"/>
+        <p14:creationId xmlns:p14="http://schemas.microsoft.com/office/powerpoint/2010/main" val="2320531404"/>
       </p:ext>
     </p:extLst>
   </p:cSld>
@@ -3856,13 +5033,81 @@
           <a:bodyPr/>
           <a:lstStyle/>
           <a:p>
-            <a:endParaRPr lang="en-US"/>
-          </a:p>
-        </p:txBody>
-      </p:sp>
-      <p:sp>
-        <p:nvSpPr>
-          <p:cNvPr id="3" name="Content Placeholder 2"/>
+            <a:r>
+              <a:rPr lang="en-US" dirty="0" smtClean="0"/>
+              <a:t>TEACHER</a:t>
+            </a:r>
+            <a:endParaRPr lang="en-US" dirty="0"/>
+          </a:p>
+        </p:txBody>
+      </p:sp>
+      <p:pic>
+        <p:nvPicPr>
+          <p:cNvPr id="1026" name="Picture 2"/>
+          <p:cNvPicPr>
+            <a:picLocks noChangeAspect="1" noChangeArrowheads="1"/>
+          </p:cNvPicPr>
+          <p:nvPr/>
+        </p:nvPicPr>
+        <p:blipFill>
+          <a:blip r:embed="rId2">
+            <a:extLst>
+              <a:ext uri="{28A0092B-C50C-407E-A947-70E740481C1C}">
+                <a14:useLocalDpi xmlns:a14="http://schemas.microsoft.com/office/drawing/2010/main" val="0"/>
+              </a:ext>
+            </a:extLst>
+          </a:blip>
+          <a:srcRect/>
+          <a:stretch>
+            <a:fillRect/>
+          </a:stretch>
+        </p:blipFill>
+        <p:spPr bwMode="auto">
+          <a:xfrm>
+            <a:off x="2514600" y="1568245"/>
+            <a:ext cx="3752850" cy="4514850"/>
+          </a:xfrm>
+          <a:prstGeom prst="rect">
+            <a:avLst/>
+          </a:prstGeom>
+          <a:noFill/>
+          <a:ln>
+            <a:noFill/>
+          </a:ln>
+          <a:effectLst/>
+          <a:extLst>
+            <a:ext uri="{909E8E84-426E-40DD-AFC4-6F175D3DCCD1}">
+              <a14:hiddenFill xmlns:a14="http://schemas.microsoft.com/office/drawing/2010/main">
+                <a:solidFill>
+                  <a:schemeClr val="accent1"/>
+                </a:solidFill>
+              </a14:hiddenFill>
+            </a:ext>
+            <a:ext uri="{91240B29-F687-4F45-9708-019B960494DF}">
+              <a14:hiddenLine xmlns:a14="http://schemas.microsoft.com/office/drawing/2010/main" w="9525">
+                <a:solidFill>
+                  <a:schemeClr val="tx1"/>
+                </a:solidFill>
+                <a:miter lim="800000"/>
+                <a:headEnd/>
+                <a:tailEnd/>
+              </a14:hiddenLine>
+            </a:ext>
+            <a:ext uri="{AF507438-7753-43E0-B8FC-AC1667EBCBE1}">
+              <a14:hiddenEffects xmlns:a14="http://schemas.microsoft.com/office/drawing/2010/main">
+                <a:effectLst>
+                  <a:outerShdw dist="35921" dir="2700000" algn="ctr" rotWithShape="0">
+                    <a:schemeClr val="bg2"/>
+                  </a:outerShdw>
+                </a:effectLst>
+              </a14:hiddenEffects>
+            </a:ext>
+          </a:extLst>
+        </p:spPr>
+      </p:pic>
+      <p:sp>
+        <p:nvSpPr>
+          <p:cNvPr id="4" name="Content Placeholder 3"/>
           <p:cNvSpPr>
             <a:spLocks noGrp="1"/>
           </p:cNvSpPr>
@@ -3875,14 +5120,14 @@
           <a:bodyPr/>
           <a:lstStyle/>
           <a:p>
-            <a:endParaRPr lang="en-US"/>
+            <a:endParaRPr lang="en-US" dirty="0"/>
           </a:p>
         </p:txBody>
       </p:sp>
     </p:spTree>
     <p:extLst>
       <p:ext uri="{BB962C8B-B14F-4D97-AF65-F5344CB8AC3E}">
-        <p14:creationId xmlns:p14="http://schemas.microsoft.com/office/powerpoint/2010/main" val="3038592272"/>
+        <p14:creationId xmlns:p14="http://schemas.microsoft.com/office/powerpoint/2010/main" val="1655604765"/>
       </p:ext>
     </p:extLst>
   </p:cSld>
@@ -3935,9 +5180,73 @@
           </a:p>
         </p:txBody>
       </p:sp>
-      <p:sp>
-        <p:nvSpPr>
-          <p:cNvPr id="3" name="Content Placeholder 2"/>
+      <p:pic>
+        <p:nvPicPr>
+          <p:cNvPr id="2051" name="Picture 3"/>
+          <p:cNvPicPr>
+            <a:picLocks noChangeAspect="1" noChangeArrowheads="1"/>
+          </p:cNvPicPr>
+          <p:nvPr/>
+        </p:nvPicPr>
+        <p:blipFill>
+          <a:blip r:embed="rId2">
+            <a:extLst>
+              <a:ext uri="{28A0092B-C50C-407E-A947-70E740481C1C}">
+                <a14:useLocalDpi xmlns:a14="http://schemas.microsoft.com/office/drawing/2010/main" val="0"/>
+              </a:ext>
+            </a:extLst>
+          </a:blip>
+          <a:srcRect/>
+          <a:stretch>
+            <a:fillRect/>
+          </a:stretch>
+        </p:blipFill>
+        <p:spPr bwMode="auto">
+          <a:xfrm>
+            <a:off x="2286000" y="1828800"/>
+            <a:ext cx="4476750" cy="4076700"/>
+          </a:xfrm>
+          <a:prstGeom prst="rect">
+            <a:avLst/>
+          </a:prstGeom>
+          <a:noFill/>
+          <a:ln>
+            <a:noFill/>
+          </a:ln>
+          <a:effectLst/>
+          <a:extLst>
+            <a:ext uri="{909E8E84-426E-40DD-AFC4-6F175D3DCCD1}">
+              <a14:hiddenFill xmlns:a14="http://schemas.microsoft.com/office/drawing/2010/main">
+                <a:solidFill>
+                  <a:schemeClr val="accent1"/>
+                </a:solidFill>
+              </a14:hiddenFill>
+            </a:ext>
+            <a:ext uri="{91240B29-F687-4F45-9708-019B960494DF}">
+              <a14:hiddenLine xmlns:a14="http://schemas.microsoft.com/office/drawing/2010/main" w="9525">
+                <a:solidFill>
+                  <a:schemeClr val="tx1"/>
+                </a:solidFill>
+                <a:miter lim="800000"/>
+                <a:headEnd/>
+                <a:tailEnd/>
+              </a14:hiddenLine>
+            </a:ext>
+            <a:ext uri="{AF507438-7753-43E0-B8FC-AC1667EBCBE1}">
+              <a14:hiddenEffects xmlns:a14="http://schemas.microsoft.com/office/drawing/2010/main">
+                <a:effectLst>
+                  <a:outerShdw dist="35921" dir="2700000" algn="ctr" rotWithShape="0">
+                    <a:schemeClr val="bg2"/>
+                  </a:outerShdw>
+                </a:effectLst>
+              </a14:hiddenEffects>
+            </a:ext>
+          </a:extLst>
+        </p:spPr>
+      </p:pic>
+      <p:sp>
+        <p:nvSpPr>
+          <p:cNvPr id="4" name="Content Placeholder 3"/>
           <p:cNvSpPr>
             <a:spLocks noGrp="1"/>
           </p:cNvSpPr>
@@ -3945,19 +5254,24 @@
             <p:ph idx="1"/>
           </p:nvPr>
         </p:nvSpPr>
-        <p:spPr/>
-        <p:txBody>
-          <a:bodyPr/>
-          <a:lstStyle/>
-          <a:p>
-            <a:endParaRPr lang="en-US"/>
+        <p:spPr>
+          <a:xfrm>
+            <a:off x="-1828800" y="1828800"/>
+            <a:ext cx="8229600" cy="4525963"/>
+          </a:xfrm>
+        </p:spPr>
+        <p:txBody>
+          <a:bodyPr/>
+          <a:lstStyle/>
+          <a:p>
+            <a:endParaRPr lang="en-US" dirty="0"/>
           </a:p>
         </p:txBody>
       </p:sp>
     </p:spTree>
     <p:extLst>
       <p:ext uri="{BB962C8B-B14F-4D97-AF65-F5344CB8AC3E}">
-        <p14:creationId xmlns:p14="http://schemas.microsoft.com/office/powerpoint/2010/main" val="2468084674"/>
+        <p14:creationId xmlns:p14="http://schemas.microsoft.com/office/powerpoint/2010/main" val="3081472930"/>
       </p:ext>
     </p:extLst>
   </p:cSld>
@@ -4025,14 +5339,142 @@
           <a:bodyPr/>
           <a:lstStyle/>
           <a:p>
-            <a:endParaRPr lang="en-US"/>
-          </a:p>
-        </p:txBody>
-      </p:sp>
+            <a:endParaRPr lang="en-US" dirty="0"/>
+          </a:p>
+        </p:txBody>
+      </p:sp>
+      <p:pic>
+        <p:nvPicPr>
+          <p:cNvPr id="3074" name="Picture 2"/>
+          <p:cNvPicPr>
+            <a:picLocks noChangeAspect="1" noChangeArrowheads="1"/>
+          </p:cNvPicPr>
+          <p:nvPr/>
+        </p:nvPicPr>
+        <p:blipFill>
+          <a:blip r:embed="rId2">
+            <a:extLst>
+              <a:ext uri="{28A0092B-C50C-407E-A947-70E740481C1C}">
+                <a14:useLocalDpi xmlns:a14="http://schemas.microsoft.com/office/drawing/2010/main" val="0"/>
+              </a:ext>
+            </a:extLst>
+          </a:blip>
+          <a:srcRect/>
+          <a:stretch>
+            <a:fillRect/>
+          </a:stretch>
+        </p:blipFill>
+        <p:spPr bwMode="auto">
+          <a:xfrm>
+            <a:off x="457200" y="685800"/>
+            <a:ext cx="6638925" cy="4981575"/>
+          </a:xfrm>
+          <a:prstGeom prst="rect">
+            <a:avLst/>
+          </a:prstGeom>
+          <a:noFill/>
+          <a:ln>
+            <a:noFill/>
+          </a:ln>
+          <a:effectLst/>
+          <a:extLst>
+            <a:ext uri="{909E8E84-426E-40DD-AFC4-6F175D3DCCD1}">
+              <a14:hiddenFill xmlns:a14="http://schemas.microsoft.com/office/drawing/2010/main">
+                <a:solidFill>
+                  <a:schemeClr val="accent1"/>
+                </a:solidFill>
+              </a14:hiddenFill>
+            </a:ext>
+            <a:ext uri="{91240B29-F687-4F45-9708-019B960494DF}">
+              <a14:hiddenLine xmlns:a14="http://schemas.microsoft.com/office/drawing/2010/main" w="9525">
+                <a:solidFill>
+                  <a:schemeClr val="tx1"/>
+                </a:solidFill>
+                <a:miter lim="800000"/>
+                <a:headEnd/>
+                <a:tailEnd/>
+              </a14:hiddenLine>
+            </a:ext>
+            <a:ext uri="{AF507438-7753-43E0-B8FC-AC1667EBCBE1}">
+              <a14:hiddenEffects xmlns:a14="http://schemas.microsoft.com/office/drawing/2010/main">
+                <a:effectLst>
+                  <a:outerShdw dist="35921" dir="2700000" algn="ctr" rotWithShape="0">
+                    <a:schemeClr val="bg2"/>
+                  </a:outerShdw>
+                </a:effectLst>
+              </a14:hiddenEffects>
+            </a:ext>
+          </a:extLst>
+        </p:spPr>
+      </p:pic>
+      <p:pic>
+        <p:nvPicPr>
+          <p:cNvPr id="6146" name="Picture 2"/>
+          <p:cNvPicPr>
+            <a:picLocks noChangeAspect="1" noChangeArrowheads="1"/>
+          </p:cNvPicPr>
+          <p:nvPr/>
+        </p:nvPicPr>
+        <p:blipFill>
+          <a:blip r:embed="rId3">
+            <a:extLst>
+              <a:ext uri="{28A0092B-C50C-407E-A947-70E740481C1C}">
+                <a14:useLocalDpi xmlns:a14="http://schemas.microsoft.com/office/drawing/2010/main" val="0"/>
+              </a:ext>
+            </a:extLst>
+          </a:blip>
+          <a:srcRect/>
+          <a:stretch>
+            <a:fillRect/>
+          </a:stretch>
+        </p:blipFill>
+        <p:spPr bwMode="auto">
+          <a:xfrm>
+            <a:off x="3429000" y="5224463"/>
+            <a:ext cx="3667125" cy="791282"/>
+          </a:xfrm>
+          <a:prstGeom prst="rect">
+            <a:avLst/>
+          </a:prstGeom>
+          <a:noFill/>
+          <a:ln>
+            <a:noFill/>
+          </a:ln>
+          <a:effectLst/>
+          <a:extLst>
+            <a:ext uri="{909E8E84-426E-40DD-AFC4-6F175D3DCCD1}">
+              <a14:hiddenFill xmlns:a14="http://schemas.microsoft.com/office/drawing/2010/main">
+                <a:solidFill>
+                  <a:schemeClr val="accent1"/>
+                </a:solidFill>
+              </a14:hiddenFill>
+            </a:ext>
+            <a:ext uri="{91240B29-F687-4F45-9708-019B960494DF}">
+              <a14:hiddenLine xmlns:a14="http://schemas.microsoft.com/office/drawing/2010/main" w="9525">
+                <a:solidFill>
+                  <a:schemeClr val="tx1"/>
+                </a:solidFill>
+                <a:miter lim="800000"/>
+                <a:headEnd/>
+                <a:tailEnd/>
+              </a14:hiddenLine>
+            </a:ext>
+            <a:ext uri="{AF507438-7753-43E0-B8FC-AC1667EBCBE1}">
+              <a14:hiddenEffects xmlns:a14="http://schemas.microsoft.com/office/drawing/2010/main">
+                <a:effectLst>
+                  <a:outerShdw dist="35921" dir="2700000" algn="ctr" rotWithShape="0">
+                    <a:schemeClr val="bg2"/>
+                  </a:outerShdw>
+                </a:effectLst>
+              </a14:hiddenEffects>
+            </a:ext>
+          </a:extLst>
+        </p:spPr>
+      </p:pic>
     </p:spTree>
     <p:extLst>
       <p:ext uri="{BB962C8B-B14F-4D97-AF65-F5344CB8AC3E}">
-        <p14:creationId xmlns:p14="http://schemas.microsoft.com/office/powerpoint/2010/main" val="388022056"/>
+        <p14:creationId xmlns:p14="http://schemas.microsoft.com/office/powerpoint/2010/main" val="3038592272"/>
       </p:ext>
     </p:extLst>
   </p:cSld>

</xml_diff>